<commit_message>
Finalized the Presentation Powerpoint
</commit_message>
<xml_diff>
--- a/Presentation.pptx
+++ b/Presentation.pptx
@@ -13,8 +13,8 @@
     <p:sldId id="258" r:id="rId4"/>
     <p:sldId id="262" r:id="rId5"/>
     <p:sldId id="264" r:id="rId6"/>
-    <p:sldId id="259" r:id="rId7"/>
-    <p:sldId id="265" r:id="rId8"/>
+    <p:sldId id="265" r:id="rId7"/>
+    <p:sldId id="259" r:id="rId8"/>
   </p:sldIdLst>
   <p:sldSz cx="24384000" cy="13716000"/>
   <p:notesSz cx="6858000" cy="9144000"/>
@@ -898,7 +898,7 @@
           </a:lstStyle>
           <a:p>
             <a:fld id="{86CB4B4D-7CA3-9044-876B-883B54F8677D}" type="slidenum">
-              <a:t>‹#›</a:t>
+              <a:t>‹Nr.›</a:t>
             </a:fld>
             <a:endParaRPr/>
           </a:p>
@@ -1020,7 +1020,7 @@
           <a:lstStyle/>
           <a:p>
             <a:fld id="{86CB4B4D-7CA3-9044-876B-883B54F8677D}" type="slidenum">
-              <a:t>‹#›</a:t>
+              <a:t>‹Nr.›</a:t>
             </a:fld>
             <a:endParaRPr/>
           </a:p>
@@ -1239,7 +1239,7 @@
           <a:lstStyle/>
           <a:p>
             <a:fld id="{86CB4B4D-7CA3-9044-876B-883B54F8677D}" type="slidenum">
-              <a:t>‹#›</a:t>
+              <a:t>‹Nr.›</a:t>
             </a:fld>
             <a:endParaRPr/>
           </a:p>
@@ -1447,7 +1447,7 @@
           <a:lstStyle/>
           <a:p>
             <a:fld id="{86CB4B4D-7CA3-9044-876B-883B54F8677D}" type="slidenum">
-              <a:t>‹#›</a:t>
+              <a:t>‹Nr.›</a:t>
             </a:fld>
             <a:endParaRPr/>
           </a:p>
@@ -1676,7 +1676,7 @@
           <a:lstStyle/>
           <a:p>
             <a:fld id="{86CB4B4D-7CA3-9044-876B-883B54F8677D}" type="slidenum">
-              <a:t>‹#›</a:t>
+              <a:t>‹Nr.›</a:t>
             </a:fld>
             <a:endParaRPr/>
           </a:p>
@@ -1910,7 +1910,7 @@
           <a:lstStyle/>
           <a:p>
             <a:fld id="{86CB4B4D-7CA3-9044-876B-883B54F8677D}" type="slidenum">
-              <a:t>‹#›</a:t>
+              <a:t>‹Nr.›</a:t>
             </a:fld>
             <a:endParaRPr/>
           </a:p>
@@ -2049,7 +2049,7 @@
           <a:lstStyle/>
           <a:p>
             <a:fld id="{86CB4B4D-7CA3-9044-876B-883B54F8677D}" type="slidenum">
-              <a:t>‹#›</a:t>
+              <a:t>‹Nr.›</a:t>
             </a:fld>
             <a:endParaRPr/>
           </a:p>
@@ -2138,7 +2138,7 @@
           </a:lstStyle>
           <a:p>
             <a:fld id="{86CB4B4D-7CA3-9044-876B-883B54F8677D}" type="slidenum">
-              <a:t>‹#›</a:t>
+              <a:t>‹Nr.›</a:t>
             </a:fld>
             <a:endParaRPr/>
           </a:p>
@@ -2190,7 +2190,7 @@
           <a:lstStyle/>
           <a:p>
             <a:fld id="{86CB4B4D-7CA3-9044-876B-883B54F8677D}" type="slidenum">
-              <a:t>‹#›</a:t>
+              <a:t>‹Nr.›</a:t>
             </a:fld>
             <a:endParaRPr/>
           </a:p>
@@ -2478,7 +2478,7 @@
           </a:lstStyle>
           <a:p>
             <a:fld id="{86CB4B4D-7CA3-9044-876B-883B54F8677D}" type="slidenum">
-              <a:t>‹#›</a:t>
+              <a:t>‹Nr.›</a:t>
             </a:fld>
             <a:endParaRPr/>
           </a:p>
@@ -2693,7 +2693,7 @@
           <a:lstStyle/>
           <a:p>
             <a:fld id="{86CB4B4D-7CA3-9044-876B-883B54F8677D}" type="slidenum">
-              <a:t>‹#›</a:t>
+              <a:t>‹Nr.›</a:t>
             </a:fld>
             <a:endParaRPr/>
           </a:p>
@@ -2852,7 +2852,7 @@
           <a:lstStyle/>
           <a:p>
             <a:fld id="{86CB4B4D-7CA3-9044-876B-883B54F8677D}" type="slidenum">
-              <a:t>‹#›</a:t>
+              <a:t>‹Nr.›</a:t>
             </a:fld>
             <a:endParaRPr/>
           </a:p>
@@ -2945,7 +2945,7 @@
           <a:lstStyle/>
           <a:p>
             <a:fld id="{86CB4B4D-7CA3-9044-876B-883B54F8677D}" type="slidenum">
-              <a:t>‹#›</a:t>
+              <a:t>‹Nr.›</a:t>
             </a:fld>
             <a:endParaRPr/>
           </a:p>
@@ -3141,7 +3141,7 @@
           <a:lstStyle/>
           <a:p>
             <a:fld id="{86CB4B4D-7CA3-9044-876B-883B54F8677D}" type="slidenum">
-              <a:t>‹#›</a:t>
+              <a:t>‹Nr.›</a:t>
             </a:fld>
             <a:endParaRPr/>
           </a:p>
@@ -3308,7 +3308,7 @@
           <a:lstStyle/>
           <a:p>
             <a:fld id="{86CB4B4D-7CA3-9044-876B-883B54F8677D}" type="slidenum">
-              <a:t>‹#›</a:t>
+              <a:t>‹Nr.›</a:t>
             </a:fld>
             <a:endParaRPr/>
           </a:p>
@@ -3475,7 +3475,7 @@
           <a:lstStyle/>
           <a:p>
             <a:fld id="{86CB4B4D-7CA3-9044-876B-883B54F8677D}" type="slidenum">
-              <a:t>‹#›</a:t>
+              <a:t>‹Nr.›</a:t>
             </a:fld>
             <a:endParaRPr/>
           </a:p>
@@ -3588,7 +3588,7 @@
           </a:lstStyle>
           <a:p>
             <a:fld id="{86CB4B4D-7CA3-9044-876B-883B54F8677D}" type="slidenum">
-              <a:t>‹#›</a:t>
+              <a:t>‹Nr.›</a:t>
             </a:fld>
             <a:endParaRPr/>
           </a:p>
@@ -3651,7 +3651,7 @@
           </a:ln>
           <a:extLst>
             <a:ext uri="{C572A759-6A51-4108-AA02-DFA0A04FC94B}">
-              <ma14:wrappingTextBoxFlag xmlns="" xmlns:m="http://schemas.openxmlformats.org/officeDocument/2006/math" xmlns:a14="http://schemas.microsoft.com/office/drawing/2010/main" xmlns:ma14="http://schemas.microsoft.com/office/mac/drawingml/2011/main" val="1"/>
+              <ma14:wrappingTextBoxFlag xmlns:ma14="http://schemas.microsoft.com/office/mac/drawingml/2011/main" xmlns:a14="http://schemas.microsoft.com/office/drawing/2010/main" xmlns:m="http://schemas.openxmlformats.org/officeDocument/2006/math" xmlns="" val="1"/>
             </a:ext>
           </a:extLst>
         </p:spPr>
@@ -3690,7 +3690,7 @@
           </a:ln>
           <a:extLst>
             <a:ext uri="{C572A759-6A51-4108-AA02-DFA0A04FC94B}">
-              <ma14:wrappingTextBoxFlag xmlns="" xmlns:m="http://schemas.openxmlformats.org/officeDocument/2006/math" xmlns:a14="http://schemas.microsoft.com/office/drawing/2010/main" xmlns:ma14="http://schemas.microsoft.com/office/mac/drawingml/2011/main" val="1"/>
+              <ma14:wrappingTextBoxFlag xmlns:ma14="http://schemas.microsoft.com/office/mac/drawingml/2011/main" xmlns:a14="http://schemas.microsoft.com/office/drawing/2010/main" xmlns:m="http://schemas.openxmlformats.org/officeDocument/2006/math" xmlns="" val="1"/>
             </a:ext>
           </a:extLst>
         </p:spPr>
@@ -3761,7 +3761,7 @@
           </a:lstStyle>
           <a:p>
             <a:fld id="{86CB4B4D-7CA3-9044-876B-883B54F8677D}" type="slidenum">
-              <a:t>‹#›</a:t>
+              <a:t>‹Nr.›</a:t>
             </a:fld>
             <a:endParaRPr/>
           </a:p>
@@ -4563,7 +4563,7 @@
           </a:prstGeom>
           <a:extLst>
             <a:ext uri="{C572A759-6A51-4108-AA02-DFA0A04FC94B}">
-              <ma14:wrappingTextBoxFlag xmlns="" xmlns:m="http://schemas.openxmlformats.org/officeDocument/2006/math" xmlns:a14="http://schemas.microsoft.com/office/drawing/2010/main" xmlns:ma14="http://schemas.microsoft.com/office/mac/drawingml/2011/main" val="1"/>
+              <ma14:wrappingTextBoxFlag xmlns:ma14="http://schemas.microsoft.com/office/mac/drawingml/2011/main" xmlns:a14="http://schemas.microsoft.com/office/drawing/2010/main" xmlns:m="http://schemas.openxmlformats.org/officeDocument/2006/math" xmlns="" val="1"/>
             </a:ext>
           </a:extLst>
         </p:spPr>
@@ -7770,7 +7770,7 @@
                 <a:cs typeface="+mn-cs"/>
                 <a:sym typeface="Helvetica Neue"/>
               </a:rPr>
-              <a:t>Classification, Accuracy…</a:t>
+              <a:t>Classification, Accuracy</a:t>
             </a:r>
           </a:p>
         </p:txBody>
@@ -8074,9 +8074,128 @@
           <a:p>
             <a:r>
               <a:rPr lang="de-CH" dirty="0"/>
-              <a:t>Research Plan (Classification Model)</a:t>
+              <a:t>Classification Model</a:t>
             </a:r>
             <a:endParaRPr dirty="0"/>
+          </a:p>
+        </p:txBody>
+      </p:sp>
+      <p:pic>
+        <p:nvPicPr>
+          <p:cNvPr id="3" name="Grafik 2" descr="Ein Bild, das Diagramm, Text, technische Zeichnung, Plan enthält.&#10;&#10;Automatisch generierte Beschreibung">
+            <a:extLst>
+              <a:ext uri="{FF2B5EF4-FFF2-40B4-BE49-F238E27FC236}">
+                <a16:creationId xmlns:a16="http://schemas.microsoft.com/office/drawing/2014/main" id="{C8AC697F-C569-2F1E-9052-C8AC86CA8632}"/>
+              </a:ext>
+            </a:extLst>
+          </p:cNvPr>
+          <p:cNvPicPr>
+            <a:picLocks noChangeAspect="1"/>
+          </p:cNvPicPr>
+          <p:nvPr/>
+        </p:nvPicPr>
+        <p:blipFill>
+          <a:blip r:embed="rId2">
+            <a:extLst>
+              <a:ext uri="{28A0092B-C50C-407E-A947-70E740481C1C}">
+                <a14:useLocalDpi xmlns:a14="http://schemas.microsoft.com/office/drawing/2010/main" val="0"/>
+              </a:ext>
+            </a:extLst>
+          </a:blip>
+          <a:stretch>
+            <a:fillRect/>
+          </a:stretch>
+        </p:blipFill>
+        <p:spPr>
+          <a:xfrm>
+            <a:off x="4808745" y="2624356"/>
+            <a:ext cx="12425770" cy="10680000"/>
+          </a:xfrm>
+          <a:prstGeom prst="rect">
+            <a:avLst/>
+          </a:prstGeom>
+        </p:spPr>
+      </p:pic>
+      <p:sp>
+        <p:nvSpPr>
+          <p:cNvPr id="4" name="Rechteck 3">
+            <a:extLst>
+              <a:ext uri="{FF2B5EF4-FFF2-40B4-BE49-F238E27FC236}">
+                <a16:creationId xmlns:a16="http://schemas.microsoft.com/office/drawing/2014/main" id="{F780B9FB-0F98-7356-81F5-74BB947A5551}"/>
+              </a:ext>
+            </a:extLst>
+          </p:cNvPr>
+          <p:cNvSpPr/>
+          <p:nvPr/>
+        </p:nvSpPr>
+        <p:spPr>
+          <a:xfrm>
+            <a:off x="11986054" y="7414053"/>
+            <a:ext cx="3237471" cy="2446638"/>
+          </a:xfrm>
+          <a:prstGeom prst="rect">
+            <a:avLst/>
+          </a:prstGeom>
+          <a:solidFill>
+            <a:srgbClr val="000000">
+              <a:alpha val="6122"/>
+            </a:srgbClr>
+          </a:solidFill>
+          <a:ln w="12700" cap="flat">
+            <a:noFill/>
+            <a:miter lim="400000"/>
+          </a:ln>
+          <a:effectLst/>
+          <a:sp3d/>
+        </p:spPr>
+        <p:style>
+          <a:lnRef idx="0">
+            <a:scrgbClr r="0" g="0" b="0"/>
+          </a:lnRef>
+          <a:fillRef idx="0">
+            <a:scrgbClr r="0" g="0" b="0"/>
+          </a:fillRef>
+          <a:effectRef idx="0">
+            <a:scrgbClr r="0" g="0" b="0"/>
+          </a:effectRef>
+          <a:fontRef idx="none"/>
+        </p:style>
+        <p:txBody>
+          <a:bodyPr rot="0" spcFirstLastPara="1" vertOverflow="overflow" horzOverflow="overflow" vert="horz" wrap="square" lIns="50800" tIns="50800" rIns="50800" bIns="50800" numCol="1" spcCol="38100" rtlCol="0" anchor="ctr">
+            <a:spAutoFit/>
+          </a:bodyPr>
+          <a:lstStyle/>
+          <a:p>
+            <a:pPr marL="0" marR="0" indent="0" algn="ctr" defTabSz="825500" rtl="0" fontAlgn="auto" latinLnBrk="0" hangingPunct="0">
+              <a:lnSpc>
+                <a:spcPct val="100000"/>
+              </a:lnSpc>
+              <a:spcBef>
+                <a:spcPts val="0"/>
+              </a:spcBef>
+              <a:spcAft>
+                <a:spcPts val="0"/>
+              </a:spcAft>
+              <a:buClrTx/>
+              <a:buSzTx/>
+              <a:buFontTx/>
+              <a:buNone/>
+              <a:tabLst/>
+            </a:pPr>
+            <a:endParaRPr kumimoji="0" lang="en-GB" sz="3200" b="0" i="0" u="none" strike="noStrike" cap="none" spc="0" normalizeH="0" baseline="0">
+              <a:ln>
+                <a:noFill/>
+              </a:ln>
+              <a:solidFill>
+                <a:srgbClr val="FFFFFF"/>
+              </a:solidFill>
+              <a:effectLst/>
+              <a:uFillTx/>
+              <a:latin typeface="Helvetica Neue Medium"/>
+              <a:ea typeface="Helvetica Neue Medium"/>
+              <a:cs typeface="Helvetica Neue Medium"/>
+              <a:sym typeface="Helvetica Neue Medium"/>
+            </a:endParaRPr>
           </a:p>
         </p:txBody>
       </p:sp>
@@ -8131,70 +8250,391 @@
           <a:lstStyle/>
           <a:p>
             <a:r>
+              <a:rPr lang="de-CH" dirty="0" err="1"/>
+              <a:t>Preliminary</a:t>
+            </a:r>
+            <a:r>
               <a:rPr lang="de-CH" dirty="0"/>
-              <a:t>Goals &amp; Challenges</a:t>
+              <a:t> </a:t>
+            </a:r>
+            <a:r>
+              <a:rPr lang="de-CH" dirty="0" err="1"/>
+              <a:t>Results</a:t>
             </a:r>
             <a:endParaRPr dirty="0"/>
           </a:p>
         </p:txBody>
       </p:sp>
-      <p:sp>
-        <p:nvSpPr>
-          <p:cNvPr id="185" name="Text für Folienpunkt"/>
-          <p:cNvSpPr txBox="1">
-            <a:spLocks noGrp="1"/>
-          </p:cNvSpPr>
-          <p:nvPr>
-            <p:ph type="body" idx="1"/>
-          </p:nvPr>
-        </p:nvSpPr>
+      <p:pic>
+        <p:nvPicPr>
+          <p:cNvPr id="5" name="Grafik 4" descr="Ein Bild, das Diagramm, Karte, Reihe, Text enthält.&#10;&#10;Automatisch generierte Beschreibung">
+            <a:extLst>
+              <a:ext uri="{FF2B5EF4-FFF2-40B4-BE49-F238E27FC236}">
+                <a16:creationId xmlns:a16="http://schemas.microsoft.com/office/drawing/2014/main" id="{B9AED734-8B2B-2742-A5CF-A0A534ACB41C}"/>
+              </a:ext>
+            </a:extLst>
+          </p:cNvPr>
+          <p:cNvPicPr>
+            <a:picLocks noChangeAspect="1"/>
+          </p:cNvPicPr>
+          <p:nvPr/>
+        </p:nvPicPr>
+        <p:blipFill>
+          <a:blip r:embed="rId2">
+            <a:extLst>
+              <a:ext uri="{28A0092B-C50C-407E-A947-70E740481C1C}">
+                <a14:useLocalDpi xmlns:a14="http://schemas.microsoft.com/office/drawing/2010/main" val="0"/>
+              </a:ext>
+            </a:extLst>
+          </a:blip>
+          <a:stretch>
+            <a:fillRect/>
+          </a:stretch>
+        </p:blipFill>
         <p:spPr>
           <a:xfrm>
-            <a:off x="1206500" y="3202024"/>
-            <a:ext cx="21971000" cy="8256012"/>
+            <a:off x="2984585" y="3014019"/>
+            <a:ext cx="15548062" cy="9927187"/>
           </a:xfrm>
           <a:prstGeom prst="rect">
             <a:avLst/>
           </a:prstGeom>
         </p:spPr>
+      </p:pic>
+      <p:sp>
+        <p:nvSpPr>
+          <p:cNvPr id="6" name="Textfeld 5">
+            <a:extLst>
+              <a:ext uri="{FF2B5EF4-FFF2-40B4-BE49-F238E27FC236}">
+                <a16:creationId xmlns:a16="http://schemas.microsoft.com/office/drawing/2014/main" id="{78BD7F5F-5108-0807-BC2F-54566530E907}"/>
+              </a:ext>
+            </a:extLst>
+          </p:cNvPr>
+          <p:cNvSpPr txBox="1"/>
+          <p:nvPr/>
+        </p:nvSpPr>
+        <p:spPr>
+          <a:xfrm>
+            <a:off x="18532647" y="5385150"/>
+            <a:ext cx="2561599" cy="1067472"/>
+          </a:xfrm>
+          <a:prstGeom prst="rect">
+            <a:avLst/>
+          </a:prstGeom>
+          <a:noFill/>
+          <a:ln w="12700" cap="flat">
+            <a:noFill/>
+            <a:miter lim="400000"/>
+          </a:ln>
+          <a:effectLst/>
+          <a:sp3d/>
+        </p:spPr>
+        <p:style>
+          <a:lnRef idx="0">
+            <a:scrgbClr r="0" g="0" b="0"/>
+          </a:lnRef>
+          <a:fillRef idx="0">
+            <a:scrgbClr r="0" g="0" b="0"/>
+          </a:fillRef>
+          <a:effectRef idx="0">
+            <a:scrgbClr r="0" g="0" b="0"/>
+          </a:effectRef>
+          <a:fontRef idx="none"/>
+        </p:style>
         <p:txBody>
-          <a:bodyPr>
-            <a:normAutofit lnSpcReduction="10000"/>
+          <a:bodyPr rot="0" spcFirstLastPara="1" vertOverflow="overflow" horzOverflow="overflow" vert="horz" wrap="none" lIns="50800" tIns="50800" rIns="50800" bIns="50800" numCol="1" spcCol="38100" rtlCol="0" anchor="ctr">
+            <a:spAutoFit/>
           </a:bodyPr>
           <a:lstStyle/>
           <a:p>
+            <a:pPr marL="0" marR="0" indent="0" algn="l" defTabSz="2438338" rtl="0" fontAlgn="auto" latinLnBrk="0" hangingPunct="0">
+              <a:lnSpc>
+                <a:spcPct val="90000"/>
+              </a:lnSpc>
+              <a:spcBef>
+                <a:spcPts val="4500"/>
+              </a:spcBef>
+              <a:spcAft>
+                <a:spcPts val="0"/>
+              </a:spcAft>
+              <a:buClrTx/>
+              <a:buSzTx/>
+              <a:buFontTx/>
+              <a:buNone/>
+              <a:tabLst/>
+            </a:pPr>
             <a:r>
-              <a:rPr lang="en-US" dirty="0"/>
-              <a:t>Model Accuracy: Develop a classification model with high accuracy for identifying hiking, jogging, cycling, and ski touring using GPS features and provide a visualization of the results. </a:t>
+              <a:rPr lang="en-GB" sz="2800" dirty="0"/>
+              <a:t>Buffered tracks</a:t>
             </a:r>
-          </a:p>
-          <a:p>
+            <a:endParaRPr kumimoji="0" lang="en-GB" sz="2800" b="0" i="0" u="none" strike="noStrike" cap="none" spc="0" normalizeH="0" baseline="0" dirty="0">
+              <a:ln>
+                <a:noFill/>
+              </a:ln>
+              <a:solidFill>
+                <a:srgbClr val="000000"/>
+              </a:solidFill>
+              <a:effectLst/>
+              <a:uFillTx/>
+              <a:latin typeface="+mn-lt"/>
+              <a:ea typeface="+mn-ea"/>
+              <a:cs typeface="+mn-cs"/>
+              <a:sym typeface="Helvetica Neue"/>
+            </a:endParaRPr>
+          </a:p>
+        </p:txBody>
+      </p:sp>
+      <p:sp>
+        <p:nvSpPr>
+          <p:cNvPr id="7" name="Textfeld 6">
+            <a:extLst>
+              <a:ext uri="{FF2B5EF4-FFF2-40B4-BE49-F238E27FC236}">
+                <a16:creationId xmlns:a16="http://schemas.microsoft.com/office/drawing/2014/main" id="{107D1896-0382-DAE0-5622-44BCC8E29E99}"/>
+              </a:ext>
+            </a:extLst>
+          </p:cNvPr>
+          <p:cNvSpPr txBox="1"/>
+          <p:nvPr/>
+        </p:nvSpPr>
+        <p:spPr>
+          <a:xfrm>
+            <a:off x="18532647" y="6195907"/>
+            <a:ext cx="4361771" cy="1067472"/>
+          </a:xfrm>
+          <a:prstGeom prst="rect">
+            <a:avLst/>
+          </a:prstGeom>
+          <a:noFill/>
+          <a:ln w="12700" cap="flat">
+            <a:noFill/>
+            <a:miter lim="400000"/>
+          </a:ln>
+          <a:effectLst/>
+          <a:sp3d/>
+        </p:spPr>
+        <p:style>
+          <a:lnRef idx="0">
+            <a:scrgbClr r="0" g="0" b="0"/>
+          </a:lnRef>
+          <a:fillRef idx="0">
+            <a:scrgbClr r="0" g="0" b="0"/>
+          </a:fillRef>
+          <a:effectRef idx="0">
+            <a:scrgbClr r="0" g="0" b="0"/>
+          </a:effectRef>
+          <a:fontRef idx="none"/>
+        </p:style>
+        <p:txBody>
+          <a:bodyPr rot="0" spcFirstLastPara="1" vertOverflow="overflow" horzOverflow="overflow" vert="horz" wrap="none" lIns="50800" tIns="50800" rIns="50800" bIns="50800" numCol="1" spcCol="38100" rtlCol="0" anchor="ctr">
+            <a:spAutoFit/>
+          </a:bodyPr>
+          <a:lstStyle/>
+          <a:p>
+            <a:pPr marL="0" marR="0" indent="0" algn="l" defTabSz="2438338" rtl="0" fontAlgn="auto" latinLnBrk="0" hangingPunct="0">
+              <a:lnSpc>
+                <a:spcPct val="90000"/>
+              </a:lnSpc>
+              <a:spcBef>
+                <a:spcPts val="4500"/>
+              </a:spcBef>
+              <a:spcAft>
+                <a:spcPts val="0"/>
+              </a:spcAft>
+              <a:buClrTx/>
+              <a:buSzTx/>
+              <a:buFontTx/>
+              <a:buNone/>
+              <a:tabLst/>
+            </a:pPr>
             <a:r>
-              <a:rPr lang="en-US" dirty="0"/>
-              <a:t>Key Features: Determine the most critical GPS features for differentiating transportation modes. </a:t>
+              <a:rPr lang="en-GB" sz="2800" dirty="0"/>
+              <a:t>Intersected Street network</a:t>
             </a:r>
-          </a:p>
-          <a:p>
-            <a:r>
-              <a:rPr lang="en-US" dirty="0"/>
-              <a:t>Practical Applications: Highlight potential applications in fitness tracking and urban planning.</a:t>
-            </a:r>
-          </a:p>
-          <a:p>
-            <a:endParaRPr lang="en-US" dirty="0"/>
-          </a:p>
-          <a:p>
-            <a:r>
-              <a:rPr lang="en-US" dirty="0"/>
-              <a:t>Challenges Addressed: Identify challenges in distinguishing similar modes (e.g., jogging &amp; biking) and propose solutions.  </a:t>
-            </a:r>
-          </a:p>
-          <a:p>
-            <a:endParaRPr lang="en-US" dirty="0"/>
+            <a:endParaRPr kumimoji="0" lang="en-GB" sz="2800" b="0" i="0" u="none" strike="noStrike" cap="none" spc="0" normalizeH="0" baseline="0" dirty="0">
+              <a:ln>
+                <a:noFill/>
+              </a:ln>
+              <a:solidFill>
+                <a:srgbClr val="000000"/>
+              </a:solidFill>
+              <a:effectLst/>
+              <a:uFillTx/>
+              <a:latin typeface="+mn-lt"/>
+              <a:ea typeface="+mn-ea"/>
+              <a:cs typeface="+mn-cs"/>
+              <a:sym typeface="Helvetica Neue"/>
+            </a:endParaRPr>
           </a:p>
         </p:txBody>
       </p:sp>
+      <p:sp>
+        <p:nvSpPr>
+          <p:cNvPr id="8" name="Rechteck 7">
+            <a:extLst>
+              <a:ext uri="{FF2B5EF4-FFF2-40B4-BE49-F238E27FC236}">
+                <a16:creationId xmlns:a16="http://schemas.microsoft.com/office/drawing/2014/main" id="{8864CE41-E88F-DEA8-19AD-FF2C2060234D}"/>
+              </a:ext>
+            </a:extLst>
+          </p:cNvPr>
+          <p:cNvSpPr/>
+          <p:nvPr/>
+        </p:nvSpPr>
+        <p:spPr>
+          <a:xfrm>
+            <a:off x="17991439" y="6912601"/>
+            <a:ext cx="370703" cy="256715"/>
+          </a:xfrm>
+          <a:prstGeom prst="rect">
+            <a:avLst/>
+          </a:prstGeom>
+          <a:solidFill>
+            <a:srgbClr val="BEBEBE"/>
+          </a:solidFill>
+          <a:ln w="12700" cap="flat">
+            <a:noFill/>
+            <a:miter lim="400000"/>
+          </a:ln>
+          <a:effectLst/>
+          <a:sp3d/>
+        </p:spPr>
+        <p:style>
+          <a:lnRef idx="0">
+            <a:scrgbClr r="0" g="0" b="0"/>
+          </a:lnRef>
+          <a:fillRef idx="0">
+            <a:scrgbClr r="0" g="0" b="0"/>
+          </a:fillRef>
+          <a:effectRef idx="0">
+            <a:scrgbClr r="0" g="0" b="0"/>
+          </a:effectRef>
+          <a:fontRef idx="none"/>
+        </p:style>
+        <p:txBody>
+          <a:bodyPr rot="0" spcFirstLastPara="1" vertOverflow="overflow" horzOverflow="overflow" vert="horz" wrap="square" lIns="50800" tIns="50800" rIns="50800" bIns="50800" numCol="1" spcCol="38100" rtlCol="0" anchor="ctr">
+            <a:spAutoFit/>
+          </a:bodyPr>
+          <a:lstStyle/>
+          <a:p>
+            <a:pPr marL="0" marR="0" indent="0" algn="ctr" defTabSz="825500" rtl="0" fontAlgn="auto" latinLnBrk="0" hangingPunct="0">
+              <a:lnSpc>
+                <a:spcPct val="100000"/>
+              </a:lnSpc>
+              <a:spcBef>
+                <a:spcPts val="0"/>
+              </a:spcBef>
+              <a:spcAft>
+                <a:spcPts val="0"/>
+              </a:spcAft>
+              <a:buClrTx/>
+              <a:buSzTx/>
+              <a:buFontTx/>
+              <a:buNone/>
+              <a:tabLst/>
+            </a:pPr>
+            <a:endParaRPr kumimoji="0" lang="en-GB" sz="3200" b="0" i="0" u="none" strike="noStrike" cap="none" spc="0" normalizeH="0" baseline="0">
+              <a:ln>
+                <a:noFill/>
+              </a:ln>
+              <a:solidFill>
+                <a:srgbClr val="FFFFFF"/>
+              </a:solidFill>
+              <a:effectLst/>
+              <a:uFillTx/>
+              <a:latin typeface="Helvetica Neue Medium"/>
+              <a:ea typeface="Helvetica Neue Medium"/>
+              <a:cs typeface="Helvetica Neue Medium"/>
+              <a:sym typeface="Helvetica Neue Medium"/>
+            </a:endParaRPr>
+          </a:p>
+        </p:txBody>
+      </p:sp>
+      <p:sp>
+        <p:nvSpPr>
+          <p:cNvPr id="9" name="Rechteck 8">
+            <a:extLst>
+              <a:ext uri="{FF2B5EF4-FFF2-40B4-BE49-F238E27FC236}">
+                <a16:creationId xmlns:a16="http://schemas.microsoft.com/office/drawing/2014/main" id="{119A36AE-E34B-3C2C-EF94-7135552F15C3}"/>
+              </a:ext>
+            </a:extLst>
+          </p:cNvPr>
+          <p:cNvSpPr/>
+          <p:nvPr/>
+        </p:nvSpPr>
+        <p:spPr>
+          <a:xfrm>
+            <a:off x="17995555" y="6076453"/>
+            <a:ext cx="370703" cy="256715"/>
+          </a:xfrm>
+          <a:prstGeom prst="rect">
+            <a:avLst/>
+          </a:prstGeom>
+          <a:solidFill>
+            <a:srgbClr val="FD2009"/>
+          </a:solidFill>
+          <a:ln w="12700" cap="flat">
+            <a:noFill/>
+            <a:miter lim="400000"/>
+          </a:ln>
+          <a:effectLst/>
+          <a:sp3d/>
+        </p:spPr>
+        <p:style>
+          <a:lnRef idx="0">
+            <a:scrgbClr r="0" g="0" b="0"/>
+          </a:lnRef>
+          <a:fillRef idx="0">
+            <a:scrgbClr r="0" g="0" b="0"/>
+          </a:fillRef>
+          <a:effectRef idx="0">
+            <a:scrgbClr r="0" g="0" b="0"/>
+          </a:effectRef>
+          <a:fontRef idx="none"/>
+        </p:style>
+        <p:txBody>
+          <a:bodyPr rot="0" spcFirstLastPara="1" vertOverflow="overflow" horzOverflow="overflow" vert="horz" wrap="square" lIns="50800" tIns="50800" rIns="50800" bIns="50800" numCol="1" spcCol="38100" rtlCol="0" anchor="ctr">
+            <a:spAutoFit/>
+          </a:bodyPr>
+          <a:lstStyle/>
+          <a:p>
+            <a:pPr marL="0" marR="0" indent="0" algn="ctr" defTabSz="825500" rtl="0" fontAlgn="auto" latinLnBrk="0" hangingPunct="0">
+              <a:lnSpc>
+                <a:spcPct val="100000"/>
+              </a:lnSpc>
+              <a:spcBef>
+                <a:spcPts val="0"/>
+              </a:spcBef>
+              <a:spcAft>
+                <a:spcPts val="0"/>
+              </a:spcAft>
+              <a:buClrTx/>
+              <a:buSzTx/>
+              <a:buFontTx/>
+              <a:buNone/>
+              <a:tabLst/>
+            </a:pPr>
+            <a:endParaRPr kumimoji="0" lang="en-GB" sz="3200" b="0" i="0" u="none" strike="noStrike" cap="none" spc="0" normalizeH="0" baseline="0">
+              <a:ln>
+                <a:noFill/>
+              </a:ln>
+              <a:solidFill>
+                <a:srgbClr val="FFFFFF"/>
+              </a:solidFill>
+              <a:effectLst/>
+              <a:uFillTx/>
+              <a:latin typeface="Helvetica Neue Medium"/>
+              <a:ea typeface="Helvetica Neue Medium"/>
+              <a:cs typeface="Helvetica Neue Medium"/>
+              <a:sym typeface="Helvetica Neue Medium"/>
+            </a:endParaRPr>
+          </a:p>
+        </p:txBody>
+      </p:sp>
     </p:spTree>
+    <p:extLst>
+      <p:ext uri="{BB962C8B-B14F-4D97-AF65-F5344CB8AC3E}">
+        <p14:creationId xmlns:p14="http://schemas.microsoft.com/office/powerpoint/2010/main" val="1846159096"/>
+      </p:ext>
+    </p:extLst>
   </p:cSld>
   <p:clrMapOvr>
     <a:masterClrMapping/>
@@ -8240,16 +8680,8 @@
           <a:lstStyle/>
           <a:p>
             <a:r>
-              <a:rPr lang="de-CH" dirty="0" err="1"/>
-              <a:t>Preliminary</a:t>
-            </a:r>
-            <a:r>
               <a:rPr lang="de-CH" dirty="0"/>
-              <a:t> </a:t>
-            </a:r>
-            <a:r>
-              <a:rPr lang="de-CH" dirty="0" err="1"/>
-              <a:t>Results</a:t>
+              <a:t>Goals &amp; Challenges</a:t>
             </a:r>
             <a:endParaRPr dirty="0"/>
           </a:p>
@@ -8282,37 +8714,51 @@
           <a:p>
             <a:r>
               <a:rPr lang="en-US" dirty="0"/>
-              <a:t>..</a:t>
+              <a:t>Model Accuracy: </a:t>
             </a:r>
-            <a:r>
-              <a:rPr lang="en-US" dirty="0" err="1"/>
-              <a:t>nur</a:t>
-            </a:r>
+            <a:br>
+              <a:rPr lang="en-US" dirty="0"/>
+            </a:br>
             <a:r>
               <a:rPr lang="en-US" dirty="0"/>
-              <a:t> falls </a:t>
+              <a:t>Develop a classification model with high accuracy</a:t>
             </a:r>
+          </a:p>
+          <a:p>
             <a:r>
-              <a:rPr lang="en-US" dirty="0" err="1"/>
-              <a:t>nötig</a:t>
+              <a:rPr lang="en-US" dirty="0"/>
+              <a:t>Key Features: </a:t>
             </a:r>
+            <a:br>
+              <a:rPr lang="en-US" dirty="0"/>
+            </a:br>
             <a:r>
-              <a:rPr lang="en-US"/>
-              <a:t>…</a:t>
+              <a:rPr lang="en-US" dirty="0"/>
+              <a:t>Determine the most critical GPS features for differentiating transportation modes</a:t>
             </a:r>
+          </a:p>
+          <a:p>
+            <a:r>
+              <a:rPr lang="en-US" dirty="0"/>
+              <a:t>Appealing result visualization</a:t>
+            </a:r>
+            <a:br>
+              <a:rPr lang="en-US" dirty="0"/>
+            </a:br>
             <a:endParaRPr lang="en-US" dirty="0"/>
           </a:p>
           <a:p>
+            <a:r>
+              <a:rPr lang="en-US" dirty="0"/>
+              <a:t>Challenges Addressed: Identify challenges in distinguishing similar modes (e.g., jogging &amp; biking) and propose solutions.  </a:t>
+            </a:r>
+          </a:p>
+          <a:p>
             <a:endParaRPr lang="en-US" dirty="0"/>
           </a:p>
         </p:txBody>
       </p:sp>
     </p:spTree>
-    <p:extLst>
-      <p:ext uri="{BB962C8B-B14F-4D97-AF65-F5344CB8AC3E}">
-        <p14:creationId xmlns:p14="http://schemas.microsoft.com/office/powerpoint/2010/main" val="1846159096"/>
-      </p:ext>
-    </p:extLst>
   </p:cSld>
   <p:clrMapOvr>
     <a:masterClrMapping/>

</xml_diff>